<commit_message>
final presentation tweaks I promise
</commit_message>
<xml_diff>
--- a/presentation/Presentation.pptx
+++ b/presentation/Presentation.pptx
@@ -4229,7 +4229,15 @@
             </a:r>
             <a:r>
               <a:rPr lang="en-US" dirty="0"/>
-              <a:t> tutorials about doing simple string comparison and bit string comparison. Essentially, we could use this for global sequence alignment. </a:t>
+              <a:t> tutorials for doing simple string comparison and bit string comparison. Essentially, we could </a:t>
+            </a:r>
+            <a:r>
+              <a:rPr lang="en-US"/>
+              <a:t>use these </a:t>
+            </a:r>
+            <a:r>
+              <a:rPr lang="en-US" dirty="0"/>
+              <a:t>for global sequence alignment. </a:t>
             </a:r>
           </a:p>
           <a:p>
@@ -5100,13 +5108,8 @@
           <a:p>
             <a:r>
               <a:rPr lang="en-US" dirty="0"/>
-              <a:t>Quantum algorithms could potentially yield significant reductions in </a:t>
-            </a:r>
-            <a:r>
-              <a:rPr lang="en-US"/>
-              <a:t>both time and space</a:t>
-            </a:r>
-            <a:endParaRPr lang="en-US" dirty="0"/>
+              <a:t>Quantum algorithms could potentially yield significant reductions in both time and space</a:t>
+            </a:r>
           </a:p>
         </p:txBody>
       </p:sp>

</xml_diff>

<commit_message>
Presentation > Fix minor punctuation issue
</commit_message>
<xml_diff>
--- a/presentation/Presentation.pptx
+++ b/presentation/Presentation.pptx
@@ -207,7 +207,7 @@
           <a:p>
             <a:fld id="{FD1487A3-50F6-AC4F-B3F5-1A7E6BD4A1DC}" type="datetimeFigureOut">
               <a:rPr lang="en-US" smtClean="0"/>
-              <a:t>6/30/20</a:t>
+              <a:t>7/1/20</a:t>
             </a:fld>
             <a:endParaRPr lang="en-US"/>
           </a:p>
@@ -871,7 +871,7 @@
           <a:p>
             <a:fld id="{27565DEB-65F6-4A49-A3B7-0A4D81EFD7BA}" type="datetimeFigureOut">
               <a:rPr lang="en-US" smtClean="0"/>
-              <a:t>6/30/20</a:t>
+              <a:t>7/1/20</a:t>
             </a:fld>
             <a:endParaRPr lang="en-US"/>
           </a:p>
@@ -1069,7 +1069,7 @@
           <a:p>
             <a:fld id="{27565DEB-65F6-4A49-A3B7-0A4D81EFD7BA}" type="datetimeFigureOut">
               <a:rPr lang="en-US" smtClean="0"/>
-              <a:t>6/30/20</a:t>
+              <a:t>7/1/20</a:t>
             </a:fld>
             <a:endParaRPr lang="en-US"/>
           </a:p>
@@ -1277,7 +1277,7 @@
           <a:p>
             <a:fld id="{27565DEB-65F6-4A49-A3B7-0A4D81EFD7BA}" type="datetimeFigureOut">
               <a:rPr lang="en-US" smtClean="0"/>
-              <a:t>6/30/20</a:t>
+              <a:t>7/1/20</a:t>
             </a:fld>
             <a:endParaRPr lang="en-US"/>
           </a:p>
@@ -1475,7 +1475,7 @@
           <a:p>
             <a:fld id="{27565DEB-65F6-4A49-A3B7-0A4D81EFD7BA}" type="datetimeFigureOut">
               <a:rPr lang="en-US" smtClean="0"/>
-              <a:t>6/30/20</a:t>
+              <a:t>7/1/20</a:t>
             </a:fld>
             <a:endParaRPr lang="en-US"/>
           </a:p>
@@ -1750,7 +1750,7 @@
           <a:p>
             <a:fld id="{27565DEB-65F6-4A49-A3B7-0A4D81EFD7BA}" type="datetimeFigureOut">
               <a:rPr lang="en-US" smtClean="0"/>
-              <a:t>6/30/20</a:t>
+              <a:t>7/1/20</a:t>
             </a:fld>
             <a:endParaRPr lang="en-US"/>
           </a:p>
@@ -2015,7 +2015,7 @@
           <a:p>
             <a:fld id="{27565DEB-65F6-4A49-A3B7-0A4D81EFD7BA}" type="datetimeFigureOut">
               <a:rPr lang="en-US" smtClean="0"/>
-              <a:t>6/30/20</a:t>
+              <a:t>7/1/20</a:t>
             </a:fld>
             <a:endParaRPr lang="en-US"/>
           </a:p>
@@ -2427,7 +2427,7 @@
           <a:p>
             <a:fld id="{27565DEB-65F6-4A49-A3B7-0A4D81EFD7BA}" type="datetimeFigureOut">
               <a:rPr lang="en-US" smtClean="0"/>
-              <a:t>6/30/20</a:t>
+              <a:t>7/1/20</a:t>
             </a:fld>
             <a:endParaRPr lang="en-US"/>
           </a:p>
@@ -2568,7 +2568,7 @@
           <a:p>
             <a:fld id="{27565DEB-65F6-4A49-A3B7-0A4D81EFD7BA}" type="datetimeFigureOut">
               <a:rPr lang="en-US" smtClean="0"/>
-              <a:t>6/30/20</a:t>
+              <a:t>7/1/20</a:t>
             </a:fld>
             <a:endParaRPr lang="en-US"/>
           </a:p>
@@ -2681,7 +2681,7 @@
           <a:p>
             <a:fld id="{27565DEB-65F6-4A49-A3B7-0A4D81EFD7BA}" type="datetimeFigureOut">
               <a:rPr lang="en-US" smtClean="0"/>
-              <a:t>6/30/20</a:t>
+              <a:t>7/1/20</a:t>
             </a:fld>
             <a:endParaRPr lang="en-US"/>
           </a:p>
@@ -2992,7 +2992,7 @@
           <a:p>
             <a:fld id="{27565DEB-65F6-4A49-A3B7-0A4D81EFD7BA}" type="datetimeFigureOut">
               <a:rPr lang="en-US" smtClean="0"/>
-              <a:t>6/30/20</a:t>
+              <a:t>7/1/20</a:t>
             </a:fld>
             <a:endParaRPr lang="en-US"/>
           </a:p>
@@ -3280,7 +3280,7 @@
           <a:p>
             <a:fld id="{27565DEB-65F6-4A49-A3B7-0A4D81EFD7BA}" type="datetimeFigureOut">
               <a:rPr lang="en-US" smtClean="0"/>
-              <a:t>6/30/20</a:t>
+              <a:t>7/1/20</a:t>
             </a:fld>
             <a:endParaRPr lang="en-US"/>
           </a:p>
@@ -3521,7 +3521,7 @@
           <a:p>
             <a:fld id="{27565DEB-65F6-4A49-A3B7-0A4D81EFD7BA}" type="datetimeFigureOut">
               <a:rPr lang="en-US" smtClean="0"/>
-              <a:t>6/30/20</a:t>
+              <a:t>7/1/20</a:t>
             </a:fld>
             <a:endParaRPr lang="en-US"/>
           </a:p>
@@ -5502,8 +5502,8 @@
           </a:p>
         </p:txBody>
       </p:sp>
-      <mc:AlternateContent xmlns:mc="http://schemas.openxmlformats.org/markup-compatibility/2006">
-        <mc:Choice xmlns:a14="http://schemas.microsoft.com/office/drawing/2010/main" Requires="a14">
+      <mc:AlternateContent xmlns:mc="http://schemas.openxmlformats.org/markup-compatibility/2006" xmlns:a14="http://schemas.microsoft.com/office/drawing/2010/main">
+        <mc:Choice Requires="a14">
           <p:sp>
             <p:nvSpPr>
               <p:cNvPr id="3" name="Content Placeholder 2">
@@ -5699,7 +5699,7 @@
             </p:txBody>
           </p:sp>
         </mc:Choice>
-        <mc:Fallback>
+        <mc:Fallback xmlns="">
           <p:sp>
             <p:nvSpPr>
               <p:cNvPr id="3" name="Content Placeholder 2">
@@ -5846,8 +5846,8 @@
           </a:p>
         </p:txBody>
       </p:sp>
-      <mc:AlternateContent xmlns:mc="http://schemas.openxmlformats.org/markup-compatibility/2006" xmlns:a14="http://schemas.microsoft.com/office/drawing/2010/main">
-        <mc:Choice Requires="a14">
+      <mc:AlternateContent xmlns:mc="http://schemas.openxmlformats.org/markup-compatibility/2006">
+        <mc:Choice xmlns:a14="http://schemas.microsoft.com/office/drawing/2010/main" Requires="a14">
           <p:sp>
             <p:nvSpPr>
               <p:cNvPr id="3" name="Content Placeholder 2">
@@ -5967,7 +5967,11 @@
                 </a14:m>
                 <a:r>
                   <a:rPr lang="en-US" dirty="0"/>
-                  <a:t> will simply yield noise for non-zero values if there is no region of similarity</a:t>
+                  <a:t> will simply yield noise for non-zero values if there is no region </a:t>
+                </a:r>
+                <a:r>
+                  <a:rPr lang="en-US"/>
+                  <a:t>of similarity.</a:t>
                 </a:r>
                 <a:endParaRPr lang="en-US" sz="1800" dirty="0"/>
               </a:p>
@@ -5977,7 +5981,7 @@
             </p:txBody>
           </p:sp>
         </mc:Choice>
-        <mc:Fallback xmlns="">
+        <mc:Fallback>
           <p:sp>
             <p:nvSpPr>
               <p:cNvPr id="3" name="Content Placeholder 2">
@@ -6149,7 +6153,7 @@
               <a:p>
                 <a:r>
                   <a:rPr lang="en-US" dirty="0"/>
-                  <a:t>Transforming matrix input into linear array.</a:t>
+                  <a:t>Transforming matrix input into linear array</a:t>
                 </a:r>
               </a:p>
               <a:p>

</xml_diff>